<commit_message>
Update Simple Shopping System.pptx
</commit_message>
<xml_diff>
--- a/Simple Shopping System.pptx
+++ b/Simple Shopping System.pptx
@@ -5,20 +5,21 @@
     <p:sldMasterId id="2147483660" r:id="rId4"/>
   </p:sldMasterIdLst>
   <p:notesMasterIdLst>
-    <p:notesMasterId r:id="rId13"/>
+    <p:notesMasterId r:id="rId14"/>
   </p:notesMasterIdLst>
   <p:handoutMasterIdLst>
-    <p:handoutMasterId r:id="rId14"/>
+    <p:handoutMasterId r:id="rId15"/>
   </p:handoutMasterIdLst>
   <p:sldIdLst>
     <p:sldId id="266" r:id="rId5"/>
-    <p:sldId id="309" r:id="rId6"/>
-    <p:sldId id="313" r:id="rId7"/>
-    <p:sldId id="310" r:id="rId8"/>
-    <p:sldId id="311" r:id="rId9"/>
-    <p:sldId id="312" r:id="rId10"/>
-    <p:sldId id="314" r:id="rId11"/>
-    <p:sldId id="315" r:id="rId12"/>
+    <p:sldId id="316" r:id="rId6"/>
+    <p:sldId id="309" r:id="rId7"/>
+    <p:sldId id="317" r:id="rId8"/>
+    <p:sldId id="310" r:id="rId9"/>
+    <p:sldId id="311" r:id="rId10"/>
+    <p:sldId id="312" r:id="rId11"/>
+    <p:sldId id="314" r:id="rId12"/>
+    <p:sldId id="315" r:id="rId13"/>
   </p:sldIdLst>
   <p:sldSz cx="12192000" cy="6858000"/>
   <p:notesSz cx="6858000" cy="9144000"/>
@@ -216,7 +217,7 @@
                 <a:latin typeface="Microsoft YaHei UI" panose="020B0503020204020204" pitchFamily="34" charset="-122"/>
                 <a:ea typeface="Microsoft YaHei UI" panose="020B0503020204020204" pitchFamily="34" charset="-122"/>
               </a:rPr>
-              <a:t>2022/8/21</a:t>
+              <a:t>2022/8/22</a:t>
             </a:fld>
             <a:endParaRPr lang="zh-CN" altLang="en-US" dirty="0">
               <a:latin typeface="Microsoft YaHei UI" panose="020B0503020204020204" pitchFamily="34" charset="-122"/>
@@ -310,6 +311,34 @@
   <p:clrMap bg1="lt1" tx1="dk1" bg2="lt2" tx2="dk2" accent1="accent1" accent2="accent2" accent3="accent3" accent4="accent4" accent5="accent5" accent6="accent6" hlink="hlink" folHlink="folHlink"/>
   <p:hf hdr="0" ftr="0" dt="0"/>
 </p:handoutMaster>
+</file>
+
+<file path=ppt/ink/ink1.xml><?xml version="1.0" encoding="utf-8"?>
+<inkml:ink xmlns:inkml="http://www.w3.org/2003/InkML">
+  <inkml:definitions>
+    <inkml:context xml:id="ctx0">
+      <inkml:inkSource xml:id="inkSrc0">
+        <inkml:traceFormat>
+          <inkml:channel name="X" type="integer" min="-2.14748E9" max="2.14748E9" units="cm"/>
+          <inkml:channel name="Y" type="integer" min="-2.14748E9" max="2.14748E9" units="cm"/>
+        </inkml:traceFormat>
+        <inkml:channelProperties>
+          <inkml:channelProperty channel="X" name="resolution" value="1000" units="1/cm"/>
+          <inkml:channelProperty channel="Y" name="resolution" value="1000" units="1/cm"/>
+        </inkml:channelProperties>
+      </inkml:inkSource>
+      <inkml:timestamp xml:id="ts0" timeString="2022-08-21T22:28:49.331"/>
+    </inkml:context>
+    <inkml:brush xml:id="br0">
+      <inkml:brushProperty name="width" value="0.1" units="cm"/>
+      <inkml:brushProperty name="height" value="0.6" units="cm"/>
+      <inkml:brushProperty name="color" value="#849398"/>
+      <inkml:brushProperty name="ignorePressure" value="1"/>
+      <inkml:brushProperty name="inkEffects" value="pencil"/>
+    </inkml:brush>
+  </inkml:definitions>
+  <inkml:trace contextRef="#ctx0" brushRef="#br0">1 0,'0'0</inkml:trace>
+</inkml:ink>
 </file>
 
 <file path=ppt/notesMasters/notesMaster1.xml><?xml version="1.0" encoding="utf-8"?>
@@ -400,7 +429,7 @@
           <a:p>
             <a:fld id="{45076F99-0C14-4B99-ADE0-2BC535F488F4}" type="datetime1">
               <a:rPr lang="zh-CN" altLang="en-US" noProof="0" smtClean="0"/>
-              <a:t>2022/8/21</a:t>
+              <a:t>2022/8/22</a:t>
             </a:fld>
             <a:endParaRPr lang="zh-CN" altLang="en-US" noProof="0" dirty="0"/>
           </a:p>
@@ -768,6 +797,99 @@
 </p:notes>
 </file>
 
+<file path=ppt/notesSlides/notesSlide2.xml><?xml version="1.0" encoding="utf-8"?>
+<p:notes xmlns:a="http://schemas.openxmlformats.org/drawingml/2006/main" xmlns:r="http://schemas.openxmlformats.org/officeDocument/2006/relationships" xmlns:p="http://schemas.openxmlformats.org/presentationml/2006/main">
+  <p:cSld>
+    <p:spTree>
+      <p:nvGrpSpPr>
+        <p:cNvPr id="1" name=""/>
+        <p:cNvGrpSpPr/>
+        <p:nvPr/>
+      </p:nvGrpSpPr>
+      <p:grpSpPr>
+        <a:xfrm>
+          <a:off x="0" y="0"/>
+          <a:ext cx="0" cy="0"/>
+          <a:chOff x="0" y="0"/>
+          <a:chExt cx="0" cy="0"/>
+        </a:xfrm>
+      </p:grpSpPr>
+      <p:sp>
+        <p:nvSpPr>
+          <p:cNvPr id="2" name="幻灯片图像占位符 1"/>
+          <p:cNvSpPr>
+            <a:spLocks noGrp="1" noRot="1" noChangeAspect="1"/>
+          </p:cNvSpPr>
+          <p:nvPr>
+            <p:ph type="sldImg"/>
+          </p:nvPr>
+        </p:nvSpPr>
+        <p:spPr/>
+      </p:sp>
+      <p:sp>
+        <p:nvSpPr>
+          <p:cNvPr id="3" name="备注占位符 2"/>
+          <p:cNvSpPr>
+            <a:spLocks noGrp="1"/>
+          </p:cNvSpPr>
+          <p:nvPr>
+            <p:ph type="body" idx="1"/>
+          </p:nvPr>
+        </p:nvSpPr>
+        <p:spPr/>
+        <p:txBody>
+          <a:bodyPr/>
+          <a:lstStyle/>
+          <a:p>
+            <a:endParaRPr lang="zh-CN" altLang="en-US" dirty="0">
+              <a:latin typeface="Microsoft YaHei UI" panose="020B0503020204020204" pitchFamily="34" charset="-122"/>
+              <a:ea typeface="Microsoft YaHei UI" panose="020B0503020204020204" pitchFamily="34" charset="-122"/>
+            </a:endParaRPr>
+          </a:p>
+        </p:txBody>
+      </p:sp>
+      <p:sp>
+        <p:nvSpPr>
+          <p:cNvPr id="4" name="灯片编号占位符 3"/>
+          <p:cNvSpPr>
+            <a:spLocks noGrp="1"/>
+          </p:cNvSpPr>
+          <p:nvPr>
+            <p:ph type="sldNum" sz="quarter" idx="10"/>
+          </p:nvPr>
+        </p:nvSpPr>
+        <p:spPr/>
+        <p:txBody>
+          <a:bodyPr/>
+          <a:lstStyle/>
+          <a:p>
+            <a:fld id="{C5504378-F5EA-4C6D-9F20-5DD5275D5EF7}" type="slidenum">
+              <a:rPr lang="en-US" altLang="zh-CN" smtClean="0">
+                <a:latin typeface="Microsoft YaHei UI" panose="020B0503020204020204" pitchFamily="34" charset="-122"/>
+                <a:ea typeface="Microsoft YaHei UI" panose="020B0503020204020204" pitchFamily="34" charset="-122"/>
+              </a:rPr>
+              <a:t>2</a:t>
+            </a:fld>
+            <a:endParaRPr lang="zh-CN" altLang="en-US" dirty="0">
+              <a:latin typeface="Microsoft YaHei UI" panose="020B0503020204020204" pitchFamily="34" charset="-122"/>
+              <a:ea typeface="Microsoft YaHei UI" panose="020B0503020204020204" pitchFamily="34" charset="-122"/>
+            </a:endParaRPr>
+          </a:p>
+        </p:txBody>
+      </p:sp>
+    </p:spTree>
+    <p:extLst>
+      <p:ext uri="{BB962C8B-B14F-4D97-AF65-F5344CB8AC3E}">
+        <p14:creationId xmlns:p14="http://schemas.microsoft.com/office/powerpoint/2010/main" val="4107486225"/>
+      </p:ext>
+    </p:extLst>
+  </p:cSld>
+  <p:clrMapOvr>
+    <a:masterClrMapping/>
+  </p:clrMapOvr>
+</p:notes>
+</file>
+
 <file path=ppt/slideLayouts/slideLayout1.xml><?xml version="1.0" encoding="utf-8"?>
 <p:sldLayout xmlns:a="http://schemas.openxmlformats.org/drawingml/2006/main" xmlns:r="http://schemas.openxmlformats.org/officeDocument/2006/relationships" xmlns:p="http://schemas.openxmlformats.org/presentationml/2006/main" showMasterSp="0" type="title" preserve="1">
   <p:cSld name="标题幻灯片">
@@ -1015,7 +1137,7 @@
             <a:pPr rtl="0"/>
             <a:fld id="{0AC2877E-34F0-45DA-BFF3-A4026ED68CD9}" type="datetime1">
               <a:rPr lang="zh-CN" altLang="en-US" noProof="0" smtClean="0"/>
-              <a:t>2022/8/21</a:t>
+              <a:t>2022/8/22</a:t>
             </a:fld>
             <a:endParaRPr lang="zh-CN" altLang="en-US" noProof="0" dirty="0"/>
           </a:p>
@@ -1207,7 +1329,7 @@
             <a:pPr rtl="0"/>
             <a:fld id="{22861A1D-D471-4C4E-BABB-70F18917C56B}" type="datetime1">
               <a:rPr lang="zh-CN" altLang="en-US" noProof="0" smtClean="0"/>
-              <a:t>2022/8/21</a:t>
+              <a:t>2022/8/22</a:t>
             </a:fld>
             <a:endParaRPr lang="zh-CN" altLang="en-US" noProof="0" dirty="0"/>
           </a:p>
@@ -1584,7 +1706,7 @@
             <a:pPr rtl="0"/>
             <a:fld id="{FC104580-E037-4962-9B10-0B01A4F4CFE2}" type="datetime1">
               <a:rPr lang="zh-CN" altLang="en-US" noProof="0" smtClean="0"/>
-              <a:t>2022/8/21</a:t>
+              <a:t>2022/8/22</a:t>
             </a:fld>
             <a:endParaRPr lang="zh-CN" altLang="en-US" noProof="0" dirty="0"/>
           </a:p>
@@ -1843,7 +1965,7 @@
             <a:pPr rtl="0"/>
             <a:fld id="{F1A6CD15-43D8-453C-99B3-FEAE68C9A9C1}" type="datetime1">
               <a:rPr lang="zh-CN" altLang="en-US" noProof="0" smtClean="0"/>
-              <a:t>2022/8/21</a:t>
+              <a:t>2022/8/22</a:t>
             </a:fld>
             <a:endParaRPr lang="zh-CN" altLang="en-US" noProof="0" dirty="0"/>
           </a:p>
@@ -2244,7 +2366,7 @@
             <a:pPr rtl="0"/>
             <a:fld id="{7DA0132F-2908-4A2D-93BA-AEA9598A4ECB}" type="datetime1">
               <a:rPr lang="zh-CN" altLang="en-US" noProof="0" smtClean="0"/>
-              <a:t>2022/8/21</a:t>
+              <a:t>2022/8/22</a:t>
             </a:fld>
             <a:endParaRPr lang="zh-CN" altLang="en-US" noProof="0" dirty="0"/>
           </a:p>
@@ -2384,7 +2506,7 @@
             <a:pPr rtl="0"/>
             <a:fld id="{772E1D73-660B-4641-A7AC-D75DB48EF001}" type="datetime1">
               <a:rPr lang="zh-CN" altLang="en-US" noProof="0" smtClean="0"/>
-              <a:t>2022/8/21</a:t>
+              <a:t>2022/8/22</a:t>
             </a:fld>
             <a:endParaRPr lang="zh-CN" altLang="en-US" noProof="0" dirty="0"/>
           </a:p>
@@ -2544,7 +2666,7 @@
             <a:pPr rtl="0"/>
             <a:fld id="{FA8DBB44-20BA-4AB1-B3C1-17ED77FEFAEC}" type="datetime1">
               <a:rPr lang="zh-CN" altLang="en-US" noProof="0" smtClean="0"/>
-              <a:t>2022/8/21</a:t>
+              <a:t>2022/8/22</a:t>
             </a:fld>
             <a:endParaRPr lang="zh-CN" altLang="en-US" noProof="0" dirty="0"/>
           </a:p>
@@ -2877,7 +2999,7 @@
             <a:pPr rtl="0"/>
             <a:fld id="{605695C5-85A1-44DB-9C6D-2F3D6204D345}" type="datetime1">
               <a:rPr lang="zh-CN" altLang="en-US" noProof="0" smtClean="0"/>
-              <a:t>2022/8/21</a:t>
+              <a:t>2022/8/22</a:t>
             </a:fld>
             <a:endParaRPr lang="zh-CN" altLang="en-US" noProof="0" dirty="0"/>
           </a:p>
@@ -3232,7 +3354,7 @@
             <a:pPr rtl="0"/>
             <a:fld id="{2DC7DA49-1BD8-44BE-9FA5-E6F240A00120}" type="datetime1">
               <a:rPr lang="zh-CN" altLang="en-US" noProof="0" smtClean="0"/>
-              <a:t>2022/8/21</a:t>
+              <a:t>2022/8/22</a:t>
             </a:fld>
             <a:endParaRPr lang="zh-CN" altLang="en-US" noProof="0" dirty="0"/>
           </a:p>
@@ -3495,7 +3617,7 @@
           <a:p>
             <a:fld id="{8E6B8250-8FD5-46A4-80E4-FF06E3DD67D1}" type="datetime1">
               <a:rPr lang="zh-CN" altLang="en-US" noProof="0" smtClean="0"/>
-              <a:t>2022/8/21</a:t>
+              <a:t>2022/8/22</a:t>
             </a:fld>
             <a:endParaRPr lang="zh-CN" altLang="en-US" noProof="0" dirty="0"/>
           </a:p>
@@ -4135,6 +4257,321 @@
         </p:nvSpPr>
         <p:spPr>
           <a:xfrm>
+            <a:off x="14472903" y="2708225"/>
+            <a:ext cx="4813072" cy="3494791"/>
+          </a:xfrm>
+        </p:spPr>
+        <p:txBody>
+          <a:bodyPr rtlCol="0">
+            <a:normAutofit/>
+          </a:bodyPr>
+          <a:lstStyle/>
+          <a:p>
+            <a:r>
+              <a:rPr lang="en-US" altLang="zh-CN" sz="4800" dirty="0">
+                <a:latin typeface="Matura MT Script Capitals" panose="03020802060602070202" pitchFamily="66" charset="0"/>
+              </a:rPr>
+              <a:t>Simple Shopping System </a:t>
+            </a:r>
+          </a:p>
+        </p:txBody>
+      </p:sp>
+      <p:sp>
+        <p:nvSpPr>
+          <p:cNvPr id="3" name="副标题 2">
+            <a:extLst>
+              <a:ext uri="{FF2B5EF4-FFF2-40B4-BE49-F238E27FC236}">
+                <a16:creationId xmlns:a16="http://schemas.microsoft.com/office/drawing/2014/main" id="{255E1F2F-E259-4EA8-9FFD-3A10AF541859}"/>
+              </a:ext>
+            </a:extLst>
+          </p:cNvPr>
+          <p:cNvSpPr>
+            <a:spLocks noGrp="1"/>
+          </p:cNvSpPr>
+          <p:nvPr>
+            <p:ph type="subTitle" idx="1"/>
+          </p:nvPr>
+        </p:nvSpPr>
+        <p:spPr>
+          <a:xfrm>
+            <a:off x="7362899" y="8911239"/>
+            <a:ext cx="4829101" cy="1238616"/>
+          </a:xfrm>
+        </p:spPr>
+        <p:txBody>
+          <a:bodyPr rtlCol="0">
+            <a:normAutofit/>
+          </a:bodyPr>
+          <a:lstStyle/>
+          <a:p>
+            <a:pPr rtl="0"/>
+            <a:r>
+              <a:rPr lang="en-US" altLang="zh-CN" dirty="0">
+                <a:latin typeface="Microsoft YaHei UI" panose="020B0503020204020204" pitchFamily="34" charset="-122"/>
+              </a:rPr>
+              <a:t>In python</a:t>
+            </a:r>
+          </a:p>
+          <a:p>
+            <a:pPr rtl="0"/>
+            <a:r>
+              <a:rPr lang="en-US" altLang="zh-CN" dirty="0">
+                <a:latin typeface="Microsoft YaHei UI" panose="020B0503020204020204" pitchFamily="34" charset="-122"/>
+              </a:rPr>
+              <a:t>By wang yuchen</a:t>
+            </a:r>
+          </a:p>
+        </p:txBody>
+      </p:sp>
+      <p:pic>
+        <p:nvPicPr>
+          <p:cNvPr id="6" name="图片 5">
+            <a:extLst>
+              <a:ext uri="{FF2B5EF4-FFF2-40B4-BE49-F238E27FC236}">
+                <a16:creationId xmlns:a16="http://schemas.microsoft.com/office/drawing/2014/main" id="{8940CBE3-3F91-419A-A649-32AB388ECA8B}"/>
+              </a:ext>
+              <a:ext uri="{C183D7F6-B498-43B3-948B-1728B52AA6E4}">
+                <adec:decorative xmlns:adec="http://schemas.microsoft.com/office/drawing/2017/decorative" val="1"/>
+              </a:ext>
+            </a:extLst>
+          </p:cNvPr>
+          <p:cNvPicPr>
+            <a:picLocks noChangeAspect="1"/>
+          </p:cNvPicPr>
+          <p:nvPr/>
+        </p:nvPicPr>
+        <p:blipFill rotWithShape="1">
+          <a:blip r:embed="rId4">
+            <a:extLst>
+              <a:ext uri="{28A0092B-C50C-407E-A947-70E740481C1C}">
+                <a14:useLocalDpi xmlns:a14="http://schemas.microsoft.com/office/drawing/2010/main" val="0"/>
+              </a:ext>
+            </a:extLst>
+          </a:blip>
+          <a:srcRect/>
+          <a:stretch/>
+        </p:blipFill>
+        <p:spPr>
+          <a:xfrm>
+            <a:off x="-7093828" y="3746101"/>
+            <a:ext cx="6096000" cy="6857990"/>
+          </a:xfrm>
+          <a:prstGeom prst="rect">
+            <a:avLst/>
+          </a:prstGeom>
+        </p:spPr>
+      </p:pic>
+      <p:cxnSp>
+        <p:nvCxnSpPr>
+          <p:cNvPr id="26" name="直接连接符 25">
+            <a:extLst>
+              <a:ext uri="{FF2B5EF4-FFF2-40B4-BE49-F238E27FC236}">
+                <a16:creationId xmlns:a16="http://schemas.microsoft.com/office/drawing/2014/main" id="{D28A9C89-B313-458F-9C85-515930A51A93}"/>
+              </a:ext>
+              <a:ext uri="{C183D7F6-B498-43B3-948B-1728B52AA6E4}">
+                <adec:decorative xmlns:adec="http://schemas.microsoft.com/office/drawing/2017/decorative" val="1"/>
+              </a:ext>
+            </a:extLst>
+          </p:cNvPr>
+          <p:cNvCxnSpPr>
+            <a:cxnSpLocks noGrp="1" noRot="1" noChangeAspect="1" noMove="1" noResize="1" noEditPoints="1" noAdjustHandles="1" noChangeArrowheads="1" noChangeShapeType="1"/>
+          </p:cNvCxnSpPr>
+          <p:nvPr>
+            <p:extLst>
+              <p:ext uri="{386F3935-93C4-4BCD-93E2-E3B085C9AB24}">
+                <p16:designElem xmlns:p16="http://schemas.microsoft.com/office/powerpoint/2015/main" val="1"/>
+              </p:ext>
+            </p:extLst>
+          </p:nvPr>
+        </p:nvCxnSpPr>
+        <p:spPr>
+          <a:xfrm>
+            <a:off x="6805053" y="4294754"/>
+            <a:ext cx="4389120" cy="0"/>
+          </a:xfrm>
+          <a:prstGeom prst="line">
+            <a:avLst/>
+          </a:prstGeom>
+          <a:ln w="12700">
+            <a:solidFill>
+              <a:schemeClr val="tx1">
+                <a:lumMod val="75000"/>
+                <a:lumOff val="25000"/>
+              </a:schemeClr>
+            </a:solidFill>
+          </a:ln>
+        </p:spPr>
+        <p:style>
+          <a:lnRef idx="1">
+            <a:schemeClr val="accent1"/>
+          </a:lnRef>
+          <a:fillRef idx="0">
+            <a:schemeClr val="accent1"/>
+          </a:fillRef>
+          <a:effectRef idx="0">
+            <a:schemeClr val="accent1"/>
+          </a:effectRef>
+          <a:fontRef idx="minor">
+            <a:schemeClr val="tx1"/>
+          </a:fontRef>
+        </p:style>
+      </p:cxnSp>
+    </p:spTree>
+    <p:extLst>
+      <p:ext uri="{BB962C8B-B14F-4D97-AF65-F5344CB8AC3E}">
+        <p14:creationId xmlns:p14="http://schemas.microsoft.com/office/powerpoint/2010/main" val="895915843"/>
+      </p:ext>
+    </p:extLst>
+  </p:cSld>
+  <p:clrMapOvr>
+    <a:masterClrMapping/>
+  </p:clrMapOvr>
+  <mc:AlternateContent xmlns:mc="http://schemas.openxmlformats.org/markup-compatibility/2006" xmlns:p159="http://schemas.microsoft.com/office/powerpoint/2015/09/main">
+    <mc:Choice Requires="p159">
+      <p:transition xmlns:p14="http://schemas.microsoft.com/office/powerpoint/2010/main" spd="slow" p14:dur="2000">
+        <p159:morph option="byObject"/>
+      </p:transition>
+    </mc:Choice>
+    <mc:Fallback xmlns="">
+      <p:transition spd="slow">
+        <p:fade/>
+      </p:transition>
+    </mc:Fallback>
+  </mc:AlternateContent>
+</p:sld>
+</file>
+
+<file path=ppt/slides/slide2.xml><?xml version="1.0" encoding="utf-8"?>
+<p:sld xmlns:a="http://schemas.openxmlformats.org/drawingml/2006/main" xmlns:r="http://schemas.openxmlformats.org/officeDocument/2006/relationships" xmlns:p="http://schemas.openxmlformats.org/presentationml/2006/main">
+  <p:cSld>
+    <p:bg>
+      <p:bgPr>
+        <a:solidFill>
+          <a:schemeClr val="bg1"/>
+        </a:solidFill>
+        <a:effectLst/>
+      </p:bgPr>
+    </p:bg>
+    <p:spTree>
+      <p:nvGrpSpPr>
+        <p:cNvPr id="1" name=""/>
+        <p:cNvGrpSpPr/>
+        <p:nvPr/>
+      </p:nvGrpSpPr>
+      <p:grpSpPr>
+        <a:xfrm>
+          <a:off x="0" y="0"/>
+          <a:ext cx="0" cy="0"/>
+          <a:chOff x="0" y="0"/>
+          <a:chExt cx="0" cy="0"/>
+        </a:xfrm>
+      </p:grpSpPr>
+      <p:sp useBgFill="1">
+        <p:nvSpPr>
+          <p:cNvPr id="24" name="长方形 23">
+            <a:extLst>
+              <a:ext uri="{FF2B5EF4-FFF2-40B4-BE49-F238E27FC236}">
+                <a16:creationId xmlns:a16="http://schemas.microsoft.com/office/drawing/2014/main" id="{F452A527-3631-41ED-858D-3777A7D1496A}"/>
+              </a:ext>
+              <a:ext uri="{C183D7F6-B498-43B3-948B-1728B52AA6E4}">
+                <adec:decorative xmlns:adec="http://schemas.microsoft.com/office/drawing/2017/decorative" val="1"/>
+              </a:ext>
+            </a:extLst>
+          </p:cNvPr>
+          <p:cNvSpPr>
+            <a:spLocks noGrp="1" noRot="1" noChangeAspect="1" noMove="1" noResize="1" noEditPoints="1" noAdjustHandles="1" noChangeArrowheads="1" noChangeShapeType="1" noTextEdit="1"/>
+          </p:cNvSpPr>
+          <p:nvPr>
+            <p:extLst>
+              <p:ext uri="{386F3935-93C4-4BCD-93E2-E3B085C9AB24}">
+                <p16:designElem xmlns:p16="http://schemas.microsoft.com/office/powerpoint/2015/main" val="1"/>
+              </p:ext>
+            </p:extLst>
+          </p:nvPr>
+        </p:nvSpPr>
+        <p:spPr>
+          <a:xfrm>
+            <a:off x="0" y="0"/>
+            <a:ext cx="12192001" cy="6858000"/>
+          </a:xfrm>
+          <a:prstGeom prst="rect">
+            <a:avLst/>
+          </a:prstGeom>
+          <a:ln>
+            <a:noFill/>
+          </a:ln>
+        </p:spPr>
+        <p:style>
+          <a:lnRef idx="2">
+            <a:schemeClr val="accent1">
+              <a:shade val="50000"/>
+            </a:schemeClr>
+          </a:lnRef>
+          <a:fillRef idx="1">
+            <a:schemeClr val="accent1"/>
+          </a:fillRef>
+          <a:effectRef idx="0">
+            <a:schemeClr val="accent1"/>
+          </a:effectRef>
+          <a:fontRef idx="minor">
+            <a:schemeClr val="lt1"/>
+          </a:fontRef>
+        </p:style>
+        <p:txBody>
+          <a:bodyPr rtlCol="0" anchor="ctr"/>
+          <a:lstStyle/>
+          <a:p>
+            <a:pPr marL="0" marR="0" lvl="0" indent="0" algn="ctr" defTabSz="914400" rtl="0" eaLnBrk="1" fontAlgn="auto" latinLnBrk="0" hangingPunct="1">
+              <a:lnSpc>
+                <a:spcPct val="100000"/>
+              </a:lnSpc>
+              <a:spcBef>
+                <a:spcPts val="0"/>
+              </a:spcBef>
+              <a:spcAft>
+                <a:spcPts val="0"/>
+              </a:spcAft>
+              <a:buClrTx/>
+              <a:buSzTx/>
+              <a:buFontTx/>
+              <a:buNone/>
+              <a:tabLst/>
+              <a:defRPr/>
+            </a:pPr>
+            <a:endParaRPr kumimoji="0" lang="zh-CN" altLang="en-US" sz="1800" b="0" i="0" u="none" strike="noStrike" kern="1200" cap="none" spc="0" normalizeH="0" baseline="0" dirty="0">
+              <a:ln>
+                <a:noFill/>
+              </a:ln>
+              <a:solidFill>
+                <a:prstClr val="white"/>
+              </a:solidFill>
+              <a:effectLst/>
+              <a:uLnTx/>
+              <a:uFillTx/>
+              <a:latin typeface="Microsoft YaHei UI" panose="020B0503020204020204" pitchFamily="34" charset="-122"/>
+              <a:ea typeface="Microsoft YaHei UI" panose="020B0503020204020204" pitchFamily="34" charset="-122"/>
+            </a:endParaRPr>
+          </a:p>
+        </p:txBody>
+      </p:sp>
+      <p:sp>
+        <p:nvSpPr>
+          <p:cNvPr id="2" name="标题 1">
+            <a:extLst>
+              <a:ext uri="{FF2B5EF4-FFF2-40B4-BE49-F238E27FC236}">
+                <a16:creationId xmlns:a16="http://schemas.microsoft.com/office/drawing/2014/main" id="{9AB2EA78-AEB3-469B-9025-3B17201A457B}"/>
+              </a:ext>
+            </a:extLst>
+          </p:cNvPr>
+          <p:cNvSpPr>
+            <a:spLocks noGrp="1"/>
+          </p:cNvSpPr>
+          <p:nvPr>
+            <p:ph type="ctrTitle"/>
+          </p:nvPr>
+        </p:nvSpPr>
+        <p:spPr>
+          <a:xfrm>
             <a:off x="6730000" y="639097"/>
             <a:ext cx="4813072" cy="3494791"/>
           </a:xfrm>
@@ -4297,202 +4734,25 @@
     </p:spTree>
     <p:extLst>
       <p:ext uri="{BB962C8B-B14F-4D97-AF65-F5344CB8AC3E}">
-        <p14:creationId xmlns:p14="http://schemas.microsoft.com/office/powerpoint/2010/main" val="895915843"/>
+        <p14:creationId xmlns:p14="http://schemas.microsoft.com/office/powerpoint/2010/main" val="2968113972"/>
       </p:ext>
     </p:extLst>
   </p:cSld>
   <p:clrMapOvr>
     <a:masterClrMapping/>
   </p:clrMapOvr>
-</p:sld>
-</file>
-
-<file path=ppt/slides/slide2.xml><?xml version="1.0" encoding="utf-8"?>
-<p:sld xmlns:a="http://schemas.openxmlformats.org/drawingml/2006/main" xmlns:r="http://schemas.openxmlformats.org/officeDocument/2006/relationships" xmlns:p="http://schemas.openxmlformats.org/presentationml/2006/main">
-  <p:cSld>
-    <p:spTree>
-      <p:nvGrpSpPr>
-        <p:cNvPr id="1" name=""/>
-        <p:cNvGrpSpPr/>
-        <p:nvPr/>
-      </p:nvGrpSpPr>
-      <p:grpSpPr>
-        <a:xfrm>
-          <a:off x="0" y="0"/>
-          <a:ext cx="0" cy="0"/>
-          <a:chOff x="0" y="0"/>
-          <a:chExt cx="0" cy="0"/>
-        </a:xfrm>
-      </p:grpSpPr>
-      <p:sp>
-        <p:nvSpPr>
-          <p:cNvPr id="2" name="标题 1">
-            <a:extLst>
-              <a:ext uri="{FF2B5EF4-FFF2-40B4-BE49-F238E27FC236}">
-                <a16:creationId xmlns:a16="http://schemas.microsoft.com/office/drawing/2014/main" id="{77F85879-B630-DDFC-2B62-876556C77F1C}"/>
-              </a:ext>
-            </a:extLst>
-          </p:cNvPr>
-          <p:cNvSpPr>
-            <a:spLocks noGrp="1"/>
-          </p:cNvSpPr>
-          <p:nvPr>
-            <p:ph type="title"/>
-          </p:nvPr>
-        </p:nvSpPr>
-        <p:spPr/>
-        <p:txBody>
-          <a:bodyPr/>
-          <a:lstStyle/>
-          <a:p>
-            <a:r>
-              <a:rPr lang="en-US" dirty="0"/>
-              <a:t>Intro:</a:t>
-            </a:r>
-          </a:p>
-        </p:txBody>
-      </p:sp>
-      <p:sp>
-        <p:nvSpPr>
-          <p:cNvPr id="3" name="内容占位符 2">
-            <a:extLst>
-              <a:ext uri="{FF2B5EF4-FFF2-40B4-BE49-F238E27FC236}">
-                <a16:creationId xmlns:a16="http://schemas.microsoft.com/office/drawing/2014/main" id="{AB5B152E-94E9-9FC5-DCE4-78932F938F70}"/>
-              </a:ext>
-            </a:extLst>
-          </p:cNvPr>
-          <p:cNvSpPr>
-            <a:spLocks noGrp="1"/>
-          </p:cNvSpPr>
-          <p:nvPr>
-            <p:ph idx="1"/>
-          </p:nvPr>
-        </p:nvSpPr>
-        <p:spPr/>
-        <p:txBody>
-          <a:bodyPr>
-            <a:normAutofit lnSpcReduction="10000"/>
-          </a:bodyPr>
-          <a:lstStyle/>
-          <a:p>
-            <a:r>
-              <a:rPr lang="en-US" dirty="0"/>
-              <a:t>The project is targeting on implementing a simple shopping terminal(admin)</a:t>
-            </a:r>
-          </a:p>
-          <a:p>
-            <a:r>
-              <a:rPr lang="en-US" dirty="0"/>
-              <a:t>At this terminal, the below several functionalities will be applied:</a:t>
-            </a:r>
-          </a:p>
-          <a:p>
-            <a:pPr>
-              <a:buFont typeface="Wingdings" panose="05000000000000000000" pitchFamily="2" charset="2"/>
-              <a:buChar char="q"/>
-            </a:pPr>
-            <a:r>
-              <a:rPr lang="en-US" dirty="0"/>
-              <a:t>Insert Categories, Products, Customers, and Orders</a:t>
-            </a:r>
-          </a:p>
-          <a:p>
-            <a:pPr>
-              <a:buFont typeface="Wingdings" panose="05000000000000000000" pitchFamily="2" charset="2"/>
-              <a:buChar char="q"/>
-            </a:pPr>
-            <a:r>
-              <a:rPr lang="en-US" dirty="0"/>
-              <a:t>Place orders for customers</a:t>
-            </a:r>
-          </a:p>
-          <a:p>
-            <a:pPr>
-              <a:buFont typeface="Wingdings" panose="05000000000000000000" pitchFamily="2" charset="2"/>
-              <a:buChar char="q"/>
-            </a:pPr>
-            <a:r>
-              <a:rPr lang="en-US" dirty="0"/>
-              <a:t>Get the total sales</a:t>
-            </a:r>
-          </a:p>
-          <a:p>
-            <a:pPr lvl="1">
-              <a:buFont typeface="Wingdings" panose="05000000000000000000" pitchFamily="2" charset="2"/>
-              <a:buChar char="q"/>
-            </a:pPr>
-            <a:r>
-              <a:rPr lang="en-US" dirty="0"/>
-              <a:t>Based on the product ID</a:t>
-            </a:r>
-          </a:p>
-          <a:p>
-            <a:pPr lvl="1">
-              <a:buFont typeface="Wingdings" panose="05000000000000000000" pitchFamily="2" charset="2"/>
-              <a:buChar char="q"/>
-            </a:pPr>
-            <a:r>
-              <a:rPr lang="en-US" dirty="0"/>
-              <a:t>Based on the category</a:t>
-            </a:r>
-          </a:p>
-          <a:p>
-            <a:pPr lvl="1">
-              <a:buFont typeface="Wingdings" panose="05000000000000000000" pitchFamily="2" charset="2"/>
-              <a:buChar char="q"/>
-            </a:pPr>
-            <a:r>
-              <a:rPr lang="en-US" dirty="0"/>
-              <a:t>Based on the sorted sum prices(for each product)</a:t>
-            </a:r>
-          </a:p>
-          <a:p>
-            <a:pPr lvl="1">
-              <a:buFont typeface="Wingdings" panose="05000000000000000000" pitchFamily="2" charset="2"/>
-              <a:buChar char="q"/>
-            </a:pPr>
-            <a:r>
-              <a:rPr lang="en-US" dirty="0"/>
-              <a:t>Based on the location of the customer</a:t>
-            </a:r>
-          </a:p>
-          <a:p>
-            <a:pPr marL="0" indent="0">
-              <a:buNone/>
-            </a:pPr>
-            <a:endParaRPr lang="en-US" dirty="0"/>
-          </a:p>
-          <a:p>
-            <a:pPr>
-              <a:buFont typeface="Wingdings" panose="05000000000000000000" pitchFamily="2" charset="2"/>
-              <a:buChar char="q"/>
-            </a:pPr>
-            <a:endParaRPr lang="en-US" dirty="0"/>
-          </a:p>
-          <a:p>
-            <a:pPr marL="0" indent="0">
-              <a:buNone/>
-            </a:pPr>
-            <a:endParaRPr lang="en-US" dirty="0"/>
-          </a:p>
-          <a:p>
-            <a:pPr marL="0" indent="0">
-              <a:buNone/>
-            </a:pPr>
-            <a:endParaRPr lang="en-US" dirty="0"/>
-          </a:p>
-        </p:txBody>
-      </p:sp>
-    </p:spTree>
-    <p:extLst>
-      <p:ext uri="{BB962C8B-B14F-4D97-AF65-F5344CB8AC3E}">
-        <p14:creationId xmlns:p14="http://schemas.microsoft.com/office/powerpoint/2010/main" val="730153447"/>
-      </p:ext>
-    </p:extLst>
-  </p:cSld>
-  <p:clrMapOvr>
-    <a:masterClrMapping/>
-  </p:clrMapOvr>
+  <mc:AlternateContent xmlns:mc="http://schemas.openxmlformats.org/markup-compatibility/2006" xmlns:p159="http://schemas.microsoft.com/office/powerpoint/2015/09/main">
+    <mc:Choice Requires="p159">
+      <p:transition xmlns:p14="http://schemas.microsoft.com/office/powerpoint/2010/main" spd="slow" p14:dur="2000">
+        <p159:morph option="byObject"/>
+      </p:transition>
+    </mc:Choice>
+    <mc:Fallback xmlns="">
+      <p:transition spd="slow">
+        <p:fade/>
+      </p:transition>
+    </mc:Fallback>
+  </mc:AlternateContent>
 </p:sld>
 </file>
 
@@ -4518,7 +4778,7 @@
           <p:cNvPr id="2" name="标题 1">
             <a:extLst>
               <a:ext uri="{FF2B5EF4-FFF2-40B4-BE49-F238E27FC236}">
-                <a16:creationId xmlns:a16="http://schemas.microsoft.com/office/drawing/2014/main" id="{8DA60C30-DDF7-4B2F-B312-DAC0A7CFCDCD}"/>
+                <a16:creationId xmlns:a16="http://schemas.microsoft.com/office/drawing/2014/main" id="{77F85879-B630-DDFC-2B62-876556C77F1C}"/>
               </a:ext>
             </a:extLst>
           </p:cNvPr>
@@ -4529,57 +4789,670 @@
             <p:ph type="title"/>
           </p:nvPr>
         </p:nvSpPr>
-        <p:spPr/>
+        <p:spPr>
+          <a:xfrm>
+            <a:off x="1097280" y="491702"/>
+            <a:ext cx="10058400" cy="1450757"/>
+          </a:xfrm>
+        </p:spPr>
         <p:txBody>
           <a:bodyPr/>
           <a:lstStyle/>
           <a:p>
             <a:r>
               <a:rPr lang="en-US" dirty="0"/>
-              <a:t>Flow chart</a:t>
-            </a:r>
-          </a:p>
-        </p:txBody>
-      </p:sp>
-      <p:pic>
-        <p:nvPicPr>
-          <p:cNvPr id="5" name="内容占位符 4" descr="图示&#10;&#10;描述已自动生成">
+              <a:t>Intro:</a:t>
+            </a:r>
+          </a:p>
+        </p:txBody>
+      </p:sp>
+      <p:sp>
+        <p:nvSpPr>
+          <p:cNvPr id="3" name="内容占位符 2">
             <a:extLst>
               <a:ext uri="{FF2B5EF4-FFF2-40B4-BE49-F238E27FC236}">
-                <a16:creationId xmlns:a16="http://schemas.microsoft.com/office/drawing/2014/main" id="{0B7835E1-22FD-3357-929C-70E3CBBC5035}"/>
+                <a16:creationId xmlns:a16="http://schemas.microsoft.com/office/drawing/2014/main" id="{AB5B152E-94E9-9FC5-DCE4-78932F938F70}"/>
               </a:ext>
             </a:extLst>
           </p:cNvPr>
-          <p:cNvPicPr>
-            <a:picLocks noGrp="1" noChangeAspect="1"/>
-          </p:cNvPicPr>
+          <p:cNvSpPr>
+            <a:spLocks noGrp="1"/>
+          </p:cNvSpPr>
           <p:nvPr>
             <p:ph idx="1"/>
           </p:nvPr>
-        </p:nvPicPr>
-        <p:blipFill>
-          <a:blip r:embed="rId2"/>
-          <a:stretch>
-            <a:fillRect/>
-          </a:stretch>
-        </p:blipFill>
+        </p:nvSpPr>
         <p:spPr>
           <a:xfrm>
-            <a:off x="4216400" y="2378869"/>
-            <a:ext cx="3819525" cy="3219450"/>
+            <a:off x="1097280" y="2264636"/>
+            <a:ext cx="10058400" cy="3879790"/>
           </a:xfrm>
         </p:spPr>
-      </p:pic>
+        <p:txBody>
+          <a:bodyPr>
+            <a:normAutofit/>
+          </a:bodyPr>
+          <a:lstStyle/>
+          <a:p>
+            <a:pPr marL="108000">
+              <a:spcBef>
+                <a:spcPts val="0"/>
+              </a:spcBef>
+            </a:pPr>
+            <a:r>
+              <a:rPr lang="en-US" sz="1800" dirty="0"/>
+              <a:t>The project is targeting on implementing a simple shopping terminal(admin)</a:t>
+            </a:r>
+          </a:p>
+          <a:p>
+            <a:pPr marL="108000">
+              <a:spcBef>
+                <a:spcPts val="0"/>
+              </a:spcBef>
+            </a:pPr>
+            <a:r>
+              <a:rPr lang="en-US" sz="1800" dirty="0"/>
+              <a:t>At this terminal, the below several functionalities will be applied:</a:t>
+            </a:r>
+          </a:p>
+          <a:p>
+            <a:pPr>
+              <a:buFont typeface="Wingdings" panose="05000000000000000000" pitchFamily="2" charset="2"/>
+              <a:buChar char="q"/>
+            </a:pPr>
+            <a:r>
+              <a:rPr lang="en-US" b="1" dirty="0"/>
+              <a:t>Insert Categories, Products, Customers, and Orders</a:t>
+            </a:r>
+          </a:p>
+          <a:p>
+            <a:pPr>
+              <a:buFont typeface="Wingdings" panose="05000000000000000000" pitchFamily="2" charset="2"/>
+              <a:buChar char="q"/>
+            </a:pPr>
+            <a:r>
+              <a:rPr lang="en-US" b="1" dirty="0"/>
+              <a:t>Place orders for customers</a:t>
+            </a:r>
+          </a:p>
+          <a:p>
+            <a:pPr>
+              <a:buFont typeface="Wingdings" panose="05000000000000000000" pitchFamily="2" charset="2"/>
+              <a:buChar char="q"/>
+            </a:pPr>
+            <a:r>
+              <a:rPr lang="en-US" b="1" dirty="0"/>
+              <a:t>Get the total sales</a:t>
+            </a:r>
+          </a:p>
+          <a:p>
+            <a:pPr lvl="1">
+              <a:buFont typeface="Wingdings" panose="05000000000000000000" pitchFamily="2" charset="2"/>
+              <a:buChar char="q"/>
+            </a:pPr>
+            <a:r>
+              <a:rPr lang="en-US" dirty="0"/>
+              <a:t>Based on the product ID</a:t>
+            </a:r>
+          </a:p>
+          <a:p>
+            <a:pPr lvl="1">
+              <a:buFont typeface="Wingdings" panose="05000000000000000000" pitchFamily="2" charset="2"/>
+              <a:buChar char="q"/>
+            </a:pPr>
+            <a:r>
+              <a:rPr lang="en-US" dirty="0"/>
+              <a:t>Based on the category</a:t>
+            </a:r>
+          </a:p>
+          <a:p>
+            <a:pPr lvl="1">
+              <a:buFont typeface="Wingdings" panose="05000000000000000000" pitchFamily="2" charset="2"/>
+              <a:buChar char="q"/>
+            </a:pPr>
+            <a:r>
+              <a:rPr lang="en-US" dirty="0"/>
+              <a:t>Based on the sorted sum prices(for each product)</a:t>
+            </a:r>
+          </a:p>
+          <a:p>
+            <a:pPr lvl="1">
+              <a:buFont typeface="Wingdings" panose="05000000000000000000" pitchFamily="2" charset="2"/>
+              <a:buChar char="q"/>
+            </a:pPr>
+            <a:r>
+              <a:rPr lang="en-US" dirty="0"/>
+              <a:t>Based on the location of the customer</a:t>
+            </a:r>
+          </a:p>
+          <a:p>
+            <a:pPr marL="0" indent="0">
+              <a:buNone/>
+            </a:pPr>
+            <a:endParaRPr lang="en-US" dirty="0"/>
+          </a:p>
+          <a:p>
+            <a:pPr>
+              <a:buFont typeface="Wingdings" panose="05000000000000000000" pitchFamily="2" charset="2"/>
+              <a:buChar char="q"/>
+            </a:pPr>
+            <a:endParaRPr lang="en-US" dirty="0"/>
+          </a:p>
+          <a:p>
+            <a:pPr marL="0" indent="0">
+              <a:buNone/>
+            </a:pPr>
+            <a:endParaRPr lang="en-US" dirty="0"/>
+          </a:p>
+          <a:p>
+            <a:pPr marL="0" indent="0">
+              <a:buNone/>
+            </a:pPr>
+            <a:endParaRPr lang="en-US" dirty="0"/>
+          </a:p>
+        </p:txBody>
+      </p:sp>
     </p:spTree>
     <p:extLst>
       <p:ext uri="{BB962C8B-B14F-4D97-AF65-F5344CB8AC3E}">
-        <p14:creationId xmlns:p14="http://schemas.microsoft.com/office/powerpoint/2010/main" val="1273611455"/>
+        <p14:creationId xmlns:p14="http://schemas.microsoft.com/office/powerpoint/2010/main" val="730153447"/>
       </p:ext>
     </p:extLst>
   </p:cSld>
   <p:clrMapOvr>
     <a:masterClrMapping/>
   </p:clrMapOvr>
+  <p:timing>
+    <p:tnLst>
+      <p:par>
+        <p:cTn id="1" dur="indefinite" restart="never" nodeType="tmRoot">
+          <p:childTnLst>
+            <p:seq concurrent="1" nextAc="seek">
+              <p:cTn id="2" dur="indefinite" nodeType="mainSeq">
+                <p:childTnLst>
+                  <p:par>
+                    <p:cTn id="3" fill="hold">
+                      <p:stCondLst>
+                        <p:cond delay="indefinite"/>
+                      </p:stCondLst>
+                      <p:childTnLst>
+                        <p:par>
+                          <p:cTn id="4" fill="hold">
+                            <p:stCondLst>
+                              <p:cond delay="0"/>
+                            </p:stCondLst>
+                            <p:childTnLst>
+                              <p:par>
+                                <p:cTn id="5" presetID="6" presetClass="entr" presetSubtype="16" fill="hold" grpId="0" nodeType="clickEffect">
+                                  <p:stCondLst>
+                                    <p:cond delay="0"/>
+                                  </p:stCondLst>
+                                  <p:childTnLst>
+                                    <p:set>
+                                      <p:cBhvr>
+                                        <p:cTn id="6" dur="1" fill="hold">
+                                          <p:stCondLst>
+                                            <p:cond delay="0"/>
+                                          </p:stCondLst>
+                                        </p:cTn>
+                                        <p:tgtEl>
+                                          <p:spTgt spid="2"/>
+                                        </p:tgtEl>
+                                        <p:attrNameLst>
+                                          <p:attrName>style.visibility</p:attrName>
+                                        </p:attrNameLst>
+                                      </p:cBhvr>
+                                      <p:to>
+                                        <p:strVal val="visible"/>
+                                      </p:to>
+                                    </p:set>
+                                    <p:animEffect transition="in" filter="circle(in)">
+                                      <p:cBhvr>
+                                        <p:cTn id="7" dur="2000"/>
+                                        <p:tgtEl>
+                                          <p:spTgt spid="2"/>
+                                        </p:tgtEl>
+                                      </p:cBhvr>
+                                    </p:animEffect>
+                                  </p:childTnLst>
+                                </p:cTn>
+                              </p:par>
+                            </p:childTnLst>
+                          </p:cTn>
+                        </p:par>
+                      </p:childTnLst>
+                    </p:cTn>
+                  </p:par>
+                  <p:par>
+                    <p:cTn id="8" fill="hold">
+                      <p:stCondLst>
+                        <p:cond delay="indefinite"/>
+                      </p:stCondLst>
+                      <p:childTnLst>
+                        <p:par>
+                          <p:cTn id="9" fill="hold">
+                            <p:stCondLst>
+                              <p:cond delay="0"/>
+                            </p:stCondLst>
+                            <p:childTnLst>
+                              <p:par>
+                                <p:cTn id="10" presetID="16" presetClass="entr" presetSubtype="21" fill="hold" nodeType="clickEffect">
+                                  <p:stCondLst>
+                                    <p:cond delay="0"/>
+                                  </p:stCondLst>
+                                  <p:childTnLst>
+                                    <p:set>
+                                      <p:cBhvr>
+                                        <p:cTn id="11" dur="1" fill="hold">
+                                          <p:stCondLst>
+                                            <p:cond delay="0"/>
+                                          </p:stCondLst>
+                                        </p:cTn>
+                                        <p:tgtEl>
+                                          <p:spTgt spid="3">
+                                            <p:txEl>
+                                              <p:pRg st="0" end="0"/>
+                                            </p:txEl>
+                                          </p:spTgt>
+                                        </p:tgtEl>
+                                        <p:attrNameLst>
+                                          <p:attrName>style.visibility</p:attrName>
+                                        </p:attrNameLst>
+                                      </p:cBhvr>
+                                      <p:to>
+                                        <p:strVal val="visible"/>
+                                      </p:to>
+                                    </p:set>
+                                    <p:animEffect transition="in" filter="barn(inVertical)">
+                                      <p:cBhvr>
+                                        <p:cTn id="12" dur="500"/>
+                                        <p:tgtEl>
+                                          <p:spTgt spid="3">
+                                            <p:txEl>
+                                              <p:pRg st="0" end="0"/>
+                                            </p:txEl>
+                                          </p:spTgt>
+                                        </p:tgtEl>
+                                      </p:cBhvr>
+                                    </p:animEffect>
+                                  </p:childTnLst>
+                                </p:cTn>
+                              </p:par>
+                              <p:par>
+                                <p:cTn id="13" presetID="16" presetClass="entr" presetSubtype="21" fill="hold" nodeType="withEffect">
+                                  <p:stCondLst>
+                                    <p:cond delay="0"/>
+                                  </p:stCondLst>
+                                  <p:childTnLst>
+                                    <p:set>
+                                      <p:cBhvr>
+                                        <p:cTn id="14" dur="1" fill="hold">
+                                          <p:stCondLst>
+                                            <p:cond delay="0"/>
+                                          </p:stCondLst>
+                                        </p:cTn>
+                                        <p:tgtEl>
+                                          <p:spTgt spid="3">
+                                            <p:txEl>
+                                              <p:pRg st="1" end="1"/>
+                                            </p:txEl>
+                                          </p:spTgt>
+                                        </p:tgtEl>
+                                        <p:attrNameLst>
+                                          <p:attrName>style.visibility</p:attrName>
+                                        </p:attrNameLst>
+                                      </p:cBhvr>
+                                      <p:to>
+                                        <p:strVal val="visible"/>
+                                      </p:to>
+                                    </p:set>
+                                    <p:animEffect transition="in" filter="barn(inVertical)">
+                                      <p:cBhvr>
+                                        <p:cTn id="15" dur="500"/>
+                                        <p:tgtEl>
+                                          <p:spTgt spid="3">
+                                            <p:txEl>
+                                              <p:pRg st="1" end="1"/>
+                                            </p:txEl>
+                                          </p:spTgt>
+                                        </p:tgtEl>
+                                      </p:cBhvr>
+                                    </p:animEffect>
+                                  </p:childTnLst>
+                                </p:cTn>
+                              </p:par>
+                              <p:par>
+                                <p:cTn id="16" presetID="16" presetClass="entr" presetSubtype="21" fill="hold" nodeType="withEffect">
+                                  <p:stCondLst>
+                                    <p:cond delay="0"/>
+                                  </p:stCondLst>
+                                  <p:childTnLst>
+                                    <p:set>
+                                      <p:cBhvr>
+                                        <p:cTn id="17" dur="1" fill="hold">
+                                          <p:stCondLst>
+                                            <p:cond delay="0"/>
+                                          </p:stCondLst>
+                                        </p:cTn>
+                                        <p:tgtEl>
+                                          <p:spTgt spid="3">
+                                            <p:txEl>
+                                              <p:pRg st="2" end="2"/>
+                                            </p:txEl>
+                                          </p:spTgt>
+                                        </p:tgtEl>
+                                        <p:attrNameLst>
+                                          <p:attrName>style.visibility</p:attrName>
+                                        </p:attrNameLst>
+                                      </p:cBhvr>
+                                      <p:to>
+                                        <p:strVal val="visible"/>
+                                      </p:to>
+                                    </p:set>
+                                    <p:animEffect transition="in" filter="barn(inVertical)">
+                                      <p:cBhvr>
+                                        <p:cTn id="18" dur="500"/>
+                                        <p:tgtEl>
+                                          <p:spTgt spid="3">
+                                            <p:txEl>
+                                              <p:pRg st="2" end="2"/>
+                                            </p:txEl>
+                                          </p:spTgt>
+                                        </p:tgtEl>
+                                      </p:cBhvr>
+                                    </p:animEffect>
+                                  </p:childTnLst>
+                                </p:cTn>
+                              </p:par>
+                              <p:par>
+                                <p:cTn id="19" presetID="16" presetClass="entr" presetSubtype="21" fill="hold" nodeType="withEffect">
+                                  <p:stCondLst>
+                                    <p:cond delay="0"/>
+                                  </p:stCondLst>
+                                  <p:childTnLst>
+                                    <p:set>
+                                      <p:cBhvr>
+                                        <p:cTn id="20" dur="1" fill="hold">
+                                          <p:stCondLst>
+                                            <p:cond delay="0"/>
+                                          </p:stCondLst>
+                                        </p:cTn>
+                                        <p:tgtEl>
+                                          <p:spTgt spid="3">
+                                            <p:txEl>
+                                              <p:pRg st="3" end="3"/>
+                                            </p:txEl>
+                                          </p:spTgt>
+                                        </p:tgtEl>
+                                        <p:attrNameLst>
+                                          <p:attrName>style.visibility</p:attrName>
+                                        </p:attrNameLst>
+                                      </p:cBhvr>
+                                      <p:to>
+                                        <p:strVal val="visible"/>
+                                      </p:to>
+                                    </p:set>
+                                    <p:animEffect transition="in" filter="barn(inVertical)">
+                                      <p:cBhvr>
+                                        <p:cTn id="21" dur="500"/>
+                                        <p:tgtEl>
+                                          <p:spTgt spid="3">
+                                            <p:txEl>
+                                              <p:pRg st="3" end="3"/>
+                                            </p:txEl>
+                                          </p:spTgt>
+                                        </p:tgtEl>
+                                      </p:cBhvr>
+                                    </p:animEffect>
+                                  </p:childTnLst>
+                                </p:cTn>
+                              </p:par>
+                              <p:par>
+                                <p:cTn id="22" presetID="16" presetClass="entr" presetSubtype="21" fill="hold" nodeType="withEffect">
+                                  <p:stCondLst>
+                                    <p:cond delay="0"/>
+                                  </p:stCondLst>
+                                  <p:childTnLst>
+                                    <p:set>
+                                      <p:cBhvr>
+                                        <p:cTn id="23" dur="1" fill="hold">
+                                          <p:stCondLst>
+                                            <p:cond delay="0"/>
+                                          </p:stCondLst>
+                                        </p:cTn>
+                                        <p:tgtEl>
+                                          <p:spTgt spid="3">
+                                            <p:txEl>
+                                              <p:pRg st="4" end="4"/>
+                                            </p:txEl>
+                                          </p:spTgt>
+                                        </p:tgtEl>
+                                        <p:attrNameLst>
+                                          <p:attrName>style.visibility</p:attrName>
+                                        </p:attrNameLst>
+                                      </p:cBhvr>
+                                      <p:to>
+                                        <p:strVal val="visible"/>
+                                      </p:to>
+                                    </p:set>
+                                    <p:animEffect transition="in" filter="barn(inVertical)">
+                                      <p:cBhvr>
+                                        <p:cTn id="24" dur="500"/>
+                                        <p:tgtEl>
+                                          <p:spTgt spid="3">
+                                            <p:txEl>
+                                              <p:pRg st="4" end="4"/>
+                                            </p:txEl>
+                                          </p:spTgt>
+                                        </p:tgtEl>
+                                      </p:cBhvr>
+                                    </p:animEffect>
+                                  </p:childTnLst>
+                                </p:cTn>
+                              </p:par>
+                              <p:par>
+                                <p:cTn id="25" presetID="16" presetClass="entr" presetSubtype="21" fill="hold" nodeType="withEffect">
+                                  <p:stCondLst>
+                                    <p:cond delay="0"/>
+                                  </p:stCondLst>
+                                  <p:childTnLst>
+                                    <p:set>
+                                      <p:cBhvr>
+                                        <p:cTn id="26" dur="1" fill="hold">
+                                          <p:stCondLst>
+                                            <p:cond delay="0"/>
+                                          </p:stCondLst>
+                                        </p:cTn>
+                                        <p:tgtEl>
+                                          <p:spTgt spid="3">
+                                            <p:txEl>
+                                              <p:pRg st="5" end="5"/>
+                                            </p:txEl>
+                                          </p:spTgt>
+                                        </p:tgtEl>
+                                        <p:attrNameLst>
+                                          <p:attrName>style.visibility</p:attrName>
+                                        </p:attrNameLst>
+                                      </p:cBhvr>
+                                      <p:to>
+                                        <p:strVal val="visible"/>
+                                      </p:to>
+                                    </p:set>
+                                    <p:animEffect transition="in" filter="barn(inVertical)">
+                                      <p:cBhvr>
+                                        <p:cTn id="27" dur="500"/>
+                                        <p:tgtEl>
+                                          <p:spTgt spid="3">
+                                            <p:txEl>
+                                              <p:pRg st="5" end="5"/>
+                                            </p:txEl>
+                                          </p:spTgt>
+                                        </p:tgtEl>
+                                      </p:cBhvr>
+                                    </p:animEffect>
+                                  </p:childTnLst>
+                                </p:cTn>
+                              </p:par>
+                              <p:par>
+                                <p:cTn id="28" presetID="16" presetClass="entr" presetSubtype="21" fill="hold" nodeType="withEffect">
+                                  <p:stCondLst>
+                                    <p:cond delay="0"/>
+                                  </p:stCondLst>
+                                  <p:childTnLst>
+                                    <p:set>
+                                      <p:cBhvr>
+                                        <p:cTn id="29" dur="1" fill="hold">
+                                          <p:stCondLst>
+                                            <p:cond delay="0"/>
+                                          </p:stCondLst>
+                                        </p:cTn>
+                                        <p:tgtEl>
+                                          <p:spTgt spid="3">
+                                            <p:txEl>
+                                              <p:pRg st="6" end="6"/>
+                                            </p:txEl>
+                                          </p:spTgt>
+                                        </p:tgtEl>
+                                        <p:attrNameLst>
+                                          <p:attrName>style.visibility</p:attrName>
+                                        </p:attrNameLst>
+                                      </p:cBhvr>
+                                      <p:to>
+                                        <p:strVal val="visible"/>
+                                      </p:to>
+                                    </p:set>
+                                    <p:animEffect transition="in" filter="barn(inVertical)">
+                                      <p:cBhvr>
+                                        <p:cTn id="30" dur="500"/>
+                                        <p:tgtEl>
+                                          <p:spTgt spid="3">
+                                            <p:txEl>
+                                              <p:pRg st="6" end="6"/>
+                                            </p:txEl>
+                                          </p:spTgt>
+                                        </p:tgtEl>
+                                      </p:cBhvr>
+                                    </p:animEffect>
+                                  </p:childTnLst>
+                                </p:cTn>
+                              </p:par>
+                              <p:par>
+                                <p:cTn id="31" presetID="16" presetClass="entr" presetSubtype="21" fill="hold" nodeType="withEffect">
+                                  <p:stCondLst>
+                                    <p:cond delay="0"/>
+                                  </p:stCondLst>
+                                  <p:childTnLst>
+                                    <p:set>
+                                      <p:cBhvr>
+                                        <p:cTn id="32" dur="1" fill="hold">
+                                          <p:stCondLst>
+                                            <p:cond delay="0"/>
+                                          </p:stCondLst>
+                                        </p:cTn>
+                                        <p:tgtEl>
+                                          <p:spTgt spid="3">
+                                            <p:txEl>
+                                              <p:pRg st="7" end="7"/>
+                                            </p:txEl>
+                                          </p:spTgt>
+                                        </p:tgtEl>
+                                        <p:attrNameLst>
+                                          <p:attrName>style.visibility</p:attrName>
+                                        </p:attrNameLst>
+                                      </p:cBhvr>
+                                      <p:to>
+                                        <p:strVal val="visible"/>
+                                      </p:to>
+                                    </p:set>
+                                    <p:animEffect transition="in" filter="barn(inVertical)">
+                                      <p:cBhvr>
+                                        <p:cTn id="33" dur="500"/>
+                                        <p:tgtEl>
+                                          <p:spTgt spid="3">
+                                            <p:txEl>
+                                              <p:pRg st="7" end="7"/>
+                                            </p:txEl>
+                                          </p:spTgt>
+                                        </p:tgtEl>
+                                      </p:cBhvr>
+                                    </p:animEffect>
+                                  </p:childTnLst>
+                                </p:cTn>
+                              </p:par>
+                              <p:par>
+                                <p:cTn id="34" presetID="16" presetClass="entr" presetSubtype="21" fill="hold" nodeType="withEffect">
+                                  <p:stCondLst>
+                                    <p:cond delay="0"/>
+                                  </p:stCondLst>
+                                  <p:childTnLst>
+                                    <p:set>
+                                      <p:cBhvr>
+                                        <p:cTn id="35" dur="1" fill="hold">
+                                          <p:stCondLst>
+                                            <p:cond delay="0"/>
+                                          </p:stCondLst>
+                                        </p:cTn>
+                                        <p:tgtEl>
+                                          <p:spTgt spid="3">
+                                            <p:txEl>
+                                              <p:pRg st="8" end="8"/>
+                                            </p:txEl>
+                                          </p:spTgt>
+                                        </p:tgtEl>
+                                        <p:attrNameLst>
+                                          <p:attrName>style.visibility</p:attrName>
+                                        </p:attrNameLst>
+                                      </p:cBhvr>
+                                      <p:to>
+                                        <p:strVal val="visible"/>
+                                      </p:to>
+                                    </p:set>
+                                    <p:animEffect transition="in" filter="barn(inVertical)">
+                                      <p:cBhvr>
+                                        <p:cTn id="36" dur="500"/>
+                                        <p:tgtEl>
+                                          <p:spTgt spid="3">
+                                            <p:txEl>
+                                              <p:pRg st="8" end="8"/>
+                                            </p:txEl>
+                                          </p:spTgt>
+                                        </p:tgtEl>
+                                      </p:cBhvr>
+                                    </p:animEffect>
+                                  </p:childTnLst>
+                                </p:cTn>
+                              </p:par>
+                            </p:childTnLst>
+                          </p:cTn>
+                        </p:par>
+                      </p:childTnLst>
+                    </p:cTn>
+                  </p:par>
+                </p:childTnLst>
+              </p:cTn>
+              <p:prevCondLst>
+                <p:cond evt="onPrev" delay="0">
+                  <p:tgtEl>
+                    <p:sldTgt/>
+                  </p:tgtEl>
+                </p:cond>
+              </p:prevCondLst>
+              <p:nextCondLst>
+                <p:cond evt="onNext" delay="0">
+                  <p:tgtEl>
+                    <p:sldTgt/>
+                  </p:tgtEl>
+                </p:cond>
+              </p:nextCondLst>
+            </p:seq>
+          </p:childTnLst>
+        </p:cTn>
+      </p:par>
+    </p:tnLst>
+    <p:bldLst>
+      <p:bldP spid="2" grpId="0"/>
+    </p:bldLst>
+  </p:timing>
 </p:sld>
 </file>
 
@@ -4605,6 +5478,439 @@
           <p:cNvPr id="2" name="标题 1">
             <a:extLst>
               <a:ext uri="{FF2B5EF4-FFF2-40B4-BE49-F238E27FC236}">
+                <a16:creationId xmlns:a16="http://schemas.microsoft.com/office/drawing/2014/main" id="{77F85879-B630-DDFC-2B62-876556C77F1C}"/>
+              </a:ext>
+            </a:extLst>
+          </p:cNvPr>
+          <p:cNvSpPr>
+            <a:spLocks noGrp="1"/>
+          </p:cNvSpPr>
+          <p:nvPr>
+            <p:ph type="title"/>
+          </p:nvPr>
+        </p:nvSpPr>
+        <p:spPr>
+          <a:xfrm>
+            <a:off x="-235132" y="-3446465"/>
+            <a:ext cx="10058400" cy="1450757"/>
+          </a:xfrm>
+        </p:spPr>
+        <p:txBody>
+          <a:bodyPr/>
+          <a:lstStyle/>
+          <a:p>
+            <a:r>
+              <a:rPr lang="en-US" dirty="0"/>
+              <a:t>Intro:</a:t>
+            </a:r>
+          </a:p>
+        </p:txBody>
+      </p:sp>
+      <p:sp>
+        <p:nvSpPr>
+          <p:cNvPr id="3" name="内容占位符 2">
+            <a:extLst>
+              <a:ext uri="{FF2B5EF4-FFF2-40B4-BE49-F238E27FC236}">
+                <a16:creationId xmlns:a16="http://schemas.microsoft.com/office/drawing/2014/main" id="{AB5B152E-94E9-9FC5-DCE4-78932F938F70}"/>
+              </a:ext>
+            </a:extLst>
+          </p:cNvPr>
+          <p:cNvSpPr>
+            <a:spLocks noGrp="1"/>
+          </p:cNvSpPr>
+          <p:nvPr>
+            <p:ph idx="1"/>
+          </p:nvPr>
+        </p:nvSpPr>
+        <p:spPr>
+          <a:xfrm>
+            <a:off x="1066800" y="-6600877"/>
+            <a:ext cx="10058400" cy="3879790"/>
+          </a:xfrm>
+        </p:spPr>
+        <p:txBody>
+          <a:bodyPr>
+            <a:normAutofit/>
+          </a:bodyPr>
+          <a:lstStyle/>
+          <a:p>
+            <a:pPr marL="108000">
+              <a:spcBef>
+                <a:spcPts val="0"/>
+              </a:spcBef>
+            </a:pPr>
+            <a:r>
+              <a:rPr lang="en-US" sz="1800" dirty="0"/>
+              <a:t>The project is targeting on implementing a simple shopping terminal(admin)</a:t>
+            </a:r>
+          </a:p>
+          <a:p>
+            <a:pPr marL="108000">
+              <a:spcBef>
+                <a:spcPts val="0"/>
+              </a:spcBef>
+            </a:pPr>
+            <a:r>
+              <a:rPr lang="en-US" sz="1800" dirty="0"/>
+              <a:t>At this terminal, the below several functionalities will be applied:</a:t>
+            </a:r>
+          </a:p>
+          <a:p>
+            <a:pPr>
+              <a:buFont typeface="Wingdings" panose="05000000000000000000" pitchFamily="2" charset="2"/>
+              <a:buChar char="q"/>
+            </a:pPr>
+            <a:r>
+              <a:rPr lang="en-US" b="1" dirty="0"/>
+              <a:t>Insert Categories, Products, Customers, and Orders</a:t>
+            </a:r>
+          </a:p>
+          <a:p>
+            <a:pPr>
+              <a:buFont typeface="Wingdings" panose="05000000000000000000" pitchFamily="2" charset="2"/>
+              <a:buChar char="q"/>
+            </a:pPr>
+            <a:r>
+              <a:rPr lang="en-US" b="1" dirty="0"/>
+              <a:t>Place orders for customers</a:t>
+            </a:r>
+          </a:p>
+          <a:p>
+            <a:pPr>
+              <a:buFont typeface="Wingdings" panose="05000000000000000000" pitchFamily="2" charset="2"/>
+              <a:buChar char="q"/>
+            </a:pPr>
+            <a:r>
+              <a:rPr lang="en-US" b="1" dirty="0"/>
+              <a:t>Get the total sales</a:t>
+            </a:r>
+          </a:p>
+          <a:p>
+            <a:pPr lvl="1">
+              <a:buFont typeface="Wingdings" panose="05000000000000000000" pitchFamily="2" charset="2"/>
+              <a:buChar char="q"/>
+            </a:pPr>
+            <a:r>
+              <a:rPr lang="en-US" dirty="0"/>
+              <a:t>Based on the product ID</a:t>
+            </a:r>
+          </a:p>
+          <a:p>
+            <a:pPr lvl="1">
+              <a:buFont typeface="Wingdings" panose="05000000000000000000" pitchFamily="2" charset="2"/>
+              <a:buChar char="q"/>
+            </a:pPr>
+            <a:r>
+              <a:rPr lang="en-US" dirty="0"/>
+              <a:t>Based on the category</a:t>
+            </a:r>
+          </a:p>
+          <a:p>
+            <a:pPr lvl="1">
+              <a:buFont typeface="Wingdings" panose="05000000000000000000" pitchFamily="2" charset="2"/>
+              <a:buChar char="q"/>
+            </a:pPr>
+            <a:r>
+              <a:rPr lang="en-US" dirty="0"/>
+              <a:t>Based on the sorted sum prices(for each product)</a:t>
+            </a:r>
+          </a:p>
+          <a:p>
+            <a:pPr lvl="1">
+              <a:buFont typeface="Wingdings" panose="05000000000000000000" pitchFamily="2" charset="2"/>
+              <a:buChar char="q"/>
+            </a:pPr>
+            <a:r>
+              <a:rPr lang="en-US" dirty="0"/>
+              <a:t>Based on the location of the customer</a:t>
+            </a:r>
+          </a:p>
+          <a:p>
+            <a:pPr marL="0" indent="0">
+              <a:buNone/>
+            </a:pPr>
+            <a:endParaRPr lang="en-US" dirty="0"/>
+          </a:p>
+          <a:p>
+            <a:pPr>
+              <a:buFont typeface="Wingdings" panose="05000000000000000000" pitchFamily="2" charset="2"/>
+              <a:buChar char="q"/>
+            </a:pPr>
+            <a:endParaRPr lang="en-US" dirty="0"/>
+          </a:p>
+          <a:p>
+            <a:pPr marL="0" indent="0">
+              <a:buNone/>
+            </a:pPr>
+            <a:endParaRPr lang="en-US" dirty="0"/>
+          </a:p>
+          <a:p>
+            <a:pPr marL="0" indent="0">
+              <a:buNone/>
+            </a:pPr>
+            <a:endParaRPr lang="en-US" dirty="0"/>
+          </a:p>
+        </p:txBody>
+      </p:sp>
+      <p:sp>
+        <p:nvSpPr>
+          <p:cNvPr id="4" name="文本框 3">
+            <a:extLst>
+              <a:ext uri="{FF2B5EF4-FFF2-40B4-BE49-F238E27FC236}">
+                <a16:creationId xmlns:a16="http://schemas.microsoft.com/office/drawing/2014/main" id="{79873F76-C71D-3E7F-0D43-DC69601945E6}"/>
+              </a:ext>
+            </a:extLst>
+          </p:cNvPr>
+          <p:cNvSpPr txBox="1"/>
+          <p:nvPr/>
+        </p:nvSpPr>
+        <p:spPr>
+          <a:xfrm>
+            <a:off x="1186543" y="1088338"/>
+            <a:ext cx="9818914" cy="757130"/>
+          </a:xfrm>
+          <a:prstGeom prst="rect">
+            <a:avLst/>
+          </a:prstGeom>
+          <a:noFill/>
+        </p:spPr>
+        <p:txBody>
+          <a:bodyPr wrap="square" rtlCol="0">
+            <a:spAutoFit/>
+          </a:bodyPr>
+          <a:lstStyle/>
+          <a:p>
+            <a:pPr>
+              <a:lnSpc>
+                <a:spcPct val="90000"/>
+              </a:lnSpc>
+              <a:spcBef>
+                <a:spcPct val="0"/>
+              </a:spcBef>
+            </a:pPr>
+            <a:r>
+              <a:rPr lang="en-US" sz="4600" spc="-50" dirty="0">
+                <a:solidFill>
+                  <a:schemeClr val="tx1">
+                    <a:lumMod val="75000"/>
+                    <a:lumOff val="25000"/>
+                  </a:schemeClr>
+                </a:solidFill>
+                <a:latin typeface="Microsoft YaHei UI" panose="020B0503020204020204" pitchFamily="34" charset="-122"/>
+                <a:ea typeface="Microsoft YaHei UI" panose="020B0503020204020204" pitchFamily="34" charset="-122"/>
+                <a:cs typeface="+mj-cs"/>
+              </a:rPr>
+              <a:t>Flow chart</a:t>
+            </a:r>
+          </a:p>
+        </p:txBody>
+      </p:sp>
+      <p:pic>
+        <p:nvPicPr>
+          <p:cNvPr id="5" name="内容占位符 4" descr="图示&#10;&#10;描述已自动生成">
+            <a:extLst>
+              <a:ext uri="{FF2B5EF4-FFF2-40B4-BE49-F238E27FC236}">
+                <a16:creationId xmlns:a16="http://schemas.microsoft.com/office/drawing/2014/main" id="{EB304214-2D99-884D-5853-63689B2EA361}"/>
+              </a:ext>
+            </a:extLst>
+          </p:cNvPr>
+          <p:cNvPicPr>
+            <a:picLocks noChangeAspect="1"/>
+          </p:cNvPicPr>
+          <p:nvPr/>
+        </p:nvPicPr>
+        <p:blipFill>
+          <a:blip r:embed="rId2"/>
+          <a:stretch>
+            <a:fillRect/>
+          </a:stretch>
+        </p:blipFill>
+        <p:spPr>
+          <a:xfrm>
+            <a:off x="4186237" y="2550212"/>
+            <a:ext cx="3819525" cy="3219450"/>
+          </a:xfrm>
+          <a:prstGeom prst="rect">
+            <a:avLst/>
+          </a:prstGeom>
+        </p:spPr>
+      </p:pic>
+    </p:spTree>
+    <p:extLst>
+      <p:ext uri="{BB962C8B-B14F-4D97-AF65-F5344CB8AC3E}">
+        <p14:creationId xmlns:p14="http://schemas.microsoft.com/office/powerpoint/2010/main" val="60838400"/>
+      </p:ext>
+    </p:extLst>
+  </p:cSld>
+  <p:clrMapOvr>
+    <a:masterClrMapping/>
+  </p:clrMapOvr>
+  <mc:AlternateContent xmlns:mc="http://schemas.openxmlformats.org/markup-compatibility/2006">
+    <mc:Choice xmlns:p159="http://schemas.microsoft.com/office/powerpoint/2015/09/main" Requires="p159">
+      <p:transition xmlns:p14="http://schemas.microsoft.com/office/powerpoint/2010/main" spd="slow" p14:dur="2000">
+        <p159:morph option="byObject"/>
+      </p:transition>
+    </mc:Choice>
+    <mc:Fallback>
+      <p:transition spd="slow">
+        <p:fade/>
+      </p:transition>
+    </mc:Fallback>
+  </mc:AlternateContent>
+  <p:timing>
+    <p:tnLst>
+      <p:par>
+        <p:cTn id="1" dur="indefinite" restart="never" nodeType="tmRoot">
+          <p:childTnLst>
+            <p:seq concurrent="1" nextAc="seek">
+              <p:cTn id="2" dur="indefinite" nodeType="mainSeq">
+                <p:childTnLst>
+                  <p:par>
+                    <p:cTn id="3" fill="hold">
+                      <p:stCondLst>
+                        <p:cond delay="indefinite"/>
+                      </p:stCondLst>
+                      <p:childTnLst>
+                        <p:par>
+                          <p:cTn id="4" fill="hold">
+                            <p:stCondLst>
+                              <p:cond delay="0"/>
+                            </p:stCondLst>
+                            <p:childTnLst>
+                              <p:par>
+                                <p:cTn id="5" presetID="42" presetClass="entr" presetSubtype="0" fill="hold" nodeType="clickEffect">
+                                  <p:stCondLst>
+                                    <p:cond delay="0"/>
+                                  </p:stCondLst>
+                                  <p:childTnLst>
+                                    <p:set>
+                                      <p:cBhvr>
+                                        <p:cTn id="6" dur="1" fill="hold">
+                                          <p:stCondLst>
+                                            <p:cond delay="0"/>
+                                          </p:stCondLst>
+                                        </p:cTn>
+                                        <p:tgtEl>
+                                          <p:spTgt spid="5"/>
+                                        </p:tgtEl>
+                                        <p:attrNameLst>
+                                          <p:attrName>style.visibility</p:attrName>
+                                        </p:attrNameLst>
+                                      </p:cBhvr>
+                                      <p:to>
+                                        <p:strVal val="visible"/>
+                                      </p:to>
+                                    </p:set>
+                                    <p:animEffect transition="in" filter="fade">
+                                      <p:cBhvr>
+                                        <p:cTn id="7" dur="1000"/>
+                                        <p:tgtEl>
+                                          <p:spTgt spid="5"/>
+                                        </p:tgtEl>
+                                      </p:cBhvr>
+                                    </p:animEffect>
+                                    <p:anim calcmode="lin" valueType="num">
+                                      <p:cBhvr>
+                                        <p:cTn id="8" dur="1000" fill="hold"/>
+                                        <p:tgtEl>
+                                          <p:spTgt spid="5"/>
+                                        </p:tgtEl>
+                                        <p:attrNameLst>
+                                          <p:attrName>ppt_x</p:attrName>
+                                        </p:attrNameLst>
+                                      </p:cBhvr>
+                                      <p:tavLst>
+                                        <p:tav tm="0">
+                                          <p:val>
+                                            <p:strVal val="#ppt_x"/>
+                                          </p:val>
+                                        </p:tav>
+                                        <p:tav tm="100000">
+                                          <p:val>
+                                            <p:strVal val="#ppt_x"/>
+                                          </p:val>
+                                        </p:tav>
+                                      </p:tavLst>
+                                    </p:anim>
+                                    <p:anim calcmode="lin" valueType="num">
+                                      <p:cBhvr>
+                                        <p:cTn id="9" dur="1000" fill="hold"/>
+                                        <p:tgtEl>
+                                          <p:spTgt spid="5"/>
+                                        </p:tgtEl>
+                                        <p:attrNameLst>
+                                          <p:attrName>ppt_y</p:attrName>
+                                        </p:attrNameLst>
+                                      </p:cBhvr>
+                                      <p:tavLst>
+                                        <p:tav tm="0">
+                                          <p:val>
+                                            <p:strVal val="#ppt_y+.1"/>
+                                          </p:val>
+                                        </p:tav>
+                                        <p:tav tm="100000">
+                                          <p:val>
+                                            <p:strVal val="#ppt_y"/>
+                                          </p:val>
+                                        </p:tav>
+                                      </p:tavLst>
+                                    </p:anim>
+                                  </p:childTnLst>
+                                </p:cTn>
+                              </p:par>
+                            </p:childTnLst>
+                          </p:cTn>
+                        </p:par>
+                      </p:childTnLst>
+                    </p:cTn>
+                  </p:par>
+                </p:childTnLst>
+              </p:cTn>
+              <p:prevCondLst>
+                <p:cond evt="onPrev" delay="0">
+                  <p:tgtEl>
+                    <p:sldTgt/>
+                  </p:tgtEl>
+                </p:cond>
+              </p:prevCondLst>
+              <p:nextCondLst>
+                <p:cond evt="onNext" delay="0">
+                  <p:tgtEl>
+                    <p:sldTgt/>
+                  </p:tgtEl>
+                </p:cond>
+              </p:nextCondLst>
+            </p:seq>
+          </p:childTnLst>
+        </p:cTn>
+      </p:par>
+    </p:tnLst>
+  </p:timing>
+</p:sld>
+</file>
+
+<file path=ppt/slides/slide5.xml><?xml version="1.0" encoding="utf-8"?>
+<p:sld xmlns:a="http://schemas.openxmlformats.org/drawingml/2006/main" xmlns:r="http://schemas.openxmlformats.org/officeDocument/2006/relationships" xmlns:p="http://schemas.openxmlformats.org/presentationml/2006/main">
+  <p:cSld>
+    <p:spTree>
+      <p:nvGrpSpPr>
+        <p:cNvPr id="1" name=""/>
+        <p:cNvGrpSpPr/>
+        <p:nvPr/>
+      </p:nvGrpSpPr>
+      <p:grpSpPr>
+        <a:xfrm>
+          <a:off x="0" y="0"/>
+          <a:ext cx="0" cy="0"/>
+          <a:chOff x="0" y="0"/>
+          <a:chExt cx="0" cy="0"/>
+        </a:xfrm>
+      </p:grpSpPr>
+      <p:sp>
+        <p:nvSpPr>
+          <p:cNvPr id="2" name="标题 1">
+            <a:extLst>
+              <a:ext uri="{FF2B5EF4-FFF2-40B4-BE49-F238E27FC236}">
                 <a16:creationId xmlns:a16="http://schemas.microsoft.com/office/drawing/2014/main" id="{133EB4EE-5EB0-4ABD-D904-C12DDE464CCB}"/>
               </a:ext>
             </a:extLst>
@@ -4652,8 +5958,8 @@
         </p:blipFill>
         <p:spPr>
           <a:xfrm>
-            <a:off x="5826852" y="113121"/>
-            <a:ext cx="5868721" cy="6314673"/>
+            <a:off x="5826853" y="113122"/>
+            <a:ext cx="5708614" cy="6142400"/>
           </a:xfrm>
         </p:spPr>
       </p:pic>
@@ -4670,7 +5976,7 @@
 </p:sld>
 </file>
 
-<file path=ppt/slides/slide5.xml><?xml version="1.0" encoding="utf-8"?>
+<file path=ppt/slides/slide6.xml><?xml version="1.0" encoding="utf-8"?>
 <p:sld xmlns:a="http://schemas.openxmlformats.org/drawingml/2006/main" xmlns:r="http://schemas.openxmlformats.org/officeDocument/2006/relationships" xmlns:p="http://schemas.openxmlformats.org/presentationml/2006/main">
   <p:cSld>
     <p:spTree>
@@ -4757,7 +6063,7 @@
 </p:sld>
 </file>
 
-<file path=ppt/slides/slide6.xml><?xml version="1.0" encoding="utf-8"?>
+<file path=ppt/slides/slide7.xml><?xml version="1.0" encoding="utf-8"?>
 <p:sld xmlns:a="http://schemas.openxmlformats.org/drawingml/2006/main" xmlns:r="http://schemas.openxmlformats.org/officeDocument/2006/relationships" xmlns:p="http://schemas.openxmlformats.org/presentationml/2006/main">
   <p:cSld>
     <p:spTree>
@@ -4844,7 +6150,7 @@
 </p:sld>
 </file>
 
-<file path=ppt/slides/slide7.xml><?xml version="1.0" encoding="utf-8"?>
+<file path=ppt/slides/slide8.xml><?xml version="1.0" encoding="utf-8"?>
 <p:sld xmlns:a="http://schemas.openxmlformats.org/drawingml/2006/main" xmlns:r="http://schemas.openxmlformats.org/officeDocument/2006/relationships" xmlns:p="http://schemas.openxmlformats.org/presentationml/2006/main">
   <p:cSld>
     <p:spTree>
@@ -4932,7 +6238,7 @@
 </p:sld>
 </file>
 
-<file path=ppt/slides/slide8.xml><?xml version="1.0" encoding="utf-8"?>
+<file path=ppt/slides/slide9.xml><?xml version="1.0" encoding="utf-8"?>
 <p:sld xmlns:a="http://schemas.openxmlformats.org/drawingml/2006/main" xmlns:r="http://schemas.openxmlformats.org/officeDocument/2006/relationships" xmlns:p="http://schemas.openxmlformats.org/presentationml/2006/main">
   <p:cSld>
     <p:spTree>
@@ -5101,6 +6407,57 @@
           </a:prstGeom>
         </p:spPr>
       </p:pic>
+      <mc:AlternateContent xmlns:mc="http://schemas.openxmlformats.org/markup-compatibility/2006" xmlns:p14="http://schemas.microsoft.com/office/powerpoint/2010/main" xmlns:aink="http://schemas.microsoft.com/office/drawing/2016/ink">
+        <mc:Choice Requires="p14 aink">
+          <p:contentPart p14:bwMode="auto" r:id="rId6">
+            <p14:nvContentPartPr>
+              <p14:cNvPr id="3" name="墨迹 2">
+                <a:extLst>
+                  <a:ext uri="{FF2B5EF4-FFF2-40B4-BE49-F238E27FC236}">
+                    <a16:creationId xmlns:a16="http://schemas.microsoft.com/office/drawing/2014/main" id="{C2883DF5-E289-07F9-78BD-BF89F8D887AE}"/>
+                  </a:ext>
+                </a:extLst>
+              </p14:cNvPr>
+              <p14:cNvContentPartPr/>
+              <p14:nvPr/>
+            </p14:nvContentPartPr>
+            <p14:xfrm>
+              <a:off x="392797" y="632103"/>
+              <a:ext cx="360" cy="360"/>
+            </p14:xfrm>
+          </p:contentPart>
+        </mc:Choice>
+        <mc:Fallback xmlns="">
+          <p:pic>
+            <p:nvPicPr>
+              <p:cNvPr id="3" name="墨迹 2">
+                <a:extLst>
+                  <a:ext uri="{FF2B5EF4-FFF2-40B4-BE49-F238E27FC236}">
+                    <a16:creationId xmlns:a16="http://schemas.microsoft.com/office/drawing/2014/main" id="{C2883DF5-E289-07F9-78BD-BF89F8D887AE}"/>
+                  </a:ext>
+                </a:extLst>
+              </p:cNvPr>
+              <p:cNvPicPr/>
+              <p:nvPr/>
+            </p:nvPicPr>
+            <p:blipFill>
+              <a:blip r:embed="rId7"/>
+              <a:stretch>
+                <a:fillRect/>
+              </a:stretch>
+            </p:blipFill>
+            <p:spPr>
+              <a:xfrm>
+                <a:off x="375157" y="524103"/>
+                <a:ext cx="36000" cy="216000"/>
+              </a:xfrm>
+              <a:prstGeom prst="rect">
+                <a:avLst/>
+              </a:prstGeom>
+            </p:spPr>
+          </p:pic>
+        </mc:Fallback>
+      </mc:AlternateContent>
     </p:spTree>
     <p:extLst>
       <p:ext uri="{BB962C8B-B14F-4D97-AF65-F5344CB8AC3E}">
@@ -5962,6 +7319,49 @@
 </a:themeOverride>
 </file>
 
+<file path=ppt/theme/themeOverride2.xml><?xml version="1.0" encoding="utf-8"?>
+<a:themeOverride xmlns:a="http://schemas.openxmlformats.org/drawingml/2006/main">
+  <a:clrScheme name="Custom 40">
+    <a:dk1>
+      <a:sysClr val="windowText" lastClr="000000"/>
+    </a:dk1>
+    <a:lt1>
+      <a:sysClr val="window" lastClr="FFFFFF"/>
+    </a:lt1>
+    <a:dk2>
+      <a:srgbClr val="545D57"/>
+    </a:dk2>
+    <a:lt2>
+      <a:srgbClr val="EBEBE8"/>
+    </a:lt2>
+    <a:accent1>
+      <a:srgbClr val="579858"/>
+    </a:accent1>
+    <a:accent2>
+      <a:srgbClr val="ED583E"/>
+    </a:accent2>
+    <a:accent3>
+      <a:srgbClr val="D3BA59"/>
+    </a:accent3>
+    <a:accent4>
+      <a:srgbClr val="4C94AC"/>
+    </a:accent4>
+    <a:accent5>
+      <a:srgbClr val="A09E84"/>
+    </a:accent5>
+    <a:accent6>
+      <a:srgbClr val="FC7D4A"/>
+    </a:accent6>
+    <a:hlink>
+      <a:srgbClr val="04A2DA"/>
+    </a:hlink>
+    <a:folHlink>
+      <a:srgbClr val="808080"/>
+    </a:folHlink>
+  </a:clrScheme>
+</a:themeOverride>
+</file>
+
 <file path=customXml/item1.xml><?xml version="1.0" encoding="utf-8"?>
 <p:properties xmlns:p="http://schemas.microsoft.com/office/2006/metadata/properties" xmlns:xsi="http://www.w3.org/2001/XMLSchema-instance" xmlns:pc="http://schemas.microsoft.com/office/infopath/2007/PartnerControls">
   <documentManagement>

</xml_diff>